<commit_message>
Updated slides with case study diagrams
</commit_message>
<xml_diff>
--- a/Production_Monitoring_Diagnostics.pptx
+++ b/Production_Monitoring_Diagnostics.pptx
@@ -32072,7 +32072,7 @@
           <a:lstStyle/>
           <a:p>
             <a:r>
-              <a:rPr lang="en-US" altLang="en-US" smtClean="0"/>
+              <a:rPr lang="en-US" altLang="en-US" dirty="0" smtClean="0"/>
               <a:t>Monitor the system for CLR exceptions w/ stacks</a:t>
             </a:r>
           </a:p>
@@ -32082,12 +32082,16 @@
               <a:buNone/>
             </a:pPr>
             <a:r>
-              <a:rPr lang="en-US" altLang="en-US" sz="2000" smtClean="0">
+              <a:rPr lang="en-US" altLang="en-US" sz="2000" dirty="0" err="1" smtClean="0">
                 <a:latin typeface="Consolas" pitchFamily="49" charset="0"/>
                 <a:cs typeface="Consolas" pitchFamily="49" charset="0"/>
               </a:rPr>
               <a:t>ExceptionTraceData</a:t>
             </a:r>
+            <a:endParaRPr lang="en-US" altLang="en-US" sz="2000" dirty="0" smtClean="0">
+              <a:latin typeface="Consolas" pitchFamily="49" charset="0"/>
+              <a:cs typeface="Consolas" pitchFamily="49" charset="0"/>
+            </a:endParaRPr>
           </a:p>
         </p:txBody>
       </p:sp>
@@ -32895,6 +32899,56 @@
       </p:grpSpPr>
       <p:sp>
         <p:nvSpPr>
+          <p:cNvPr id="10" name="Rounded Rectangle 9"/>
+          <p:cNvSpPr/>
+          <p:nvPr/>
+        </p:nvSpPr>
+        <p:spPr>
+          <a:xfrm>
+            <a:off x="1403648" y="1654784"/>
+            <a:ext cx="2520280" cy="4176464"/>
+          </a:xfrm>
+          <a:prstGeom prst="roundRect">
+            <a:avLst/>
+          </a:prstGeom>
+        </p:spPr>
+        <p:style>
+          <a:lnRef idx="1">
+            <a:schemeClr val="accent1"/>
+          </a:lnRef>
+          <a:fillRef idx="2">
+            <a:schemeClr val="accent1"/>
+          </a:fillRef>
+          <a:effectRef idx="1">
+            <a:schemeClr val="accent1"/>
+          </a:effectRef>
+          <a:fontRef idx="minor">
+            <a:schemeClr val="dk1"/>
+          </a:fontRef>
+        </p:style>
+        <p:txBody>
+          <a:bodyPr rtlCol="0" anchor="t"/>
+          <a:lstStyle/>
+          <a:p>
+            <a:pPr algn="ctr"/>
+            <a:r>
+              <a:rPr lang="en-US" dirty="0" smtClean="0">
+                <a:latin typeface="Segoe" charset="0"/>
+                <a:ea typeface="Segoe" charset="0"/>
+                <a:cs typeface="Segoe" charset="0"/>
+              </a:rPr>
+              <a:t>Web server</a:t>
+            </a:r>
+            <a:endParaRPr lang="en-US" dirty="0">
+              <a:latin typeface="Segoe" charset="0"/>
+              <a:ea typeface="Segoe" charset="0"/>
+              <a:cs typeface="Segoe" charset="0"/>
+            </a:endParaRPr>
+          </a:p>
+        </p:txBody>
+      </p:sp>
+      <p:sp>
+        <p:nvSpPr>
           <p:cNvPr id="4" name="Title 3"/>
           <p:cNvSpPr>
             <a:spLocks noGrp="1"/>
@@ -32911,12 +32965,8 @@
           <a:lstStyle/>
           <a:p>
             <a:r>
-              <a:rPr lang="en-US" dirty="0" err="1" smtClean="0"/>
-              <a:t>SBTech</a:t>
-            </a:r>
-            <a:r>
               <a:rPr lang="en-US" dirty="0" smtClean="0"/>
-              <a:t> Performance Monitoring Workflow</a:t>
+              <a:t>Client1 Performance Monitoring Workflow</a:t>
             </a:r>
             <a:endParaRPr lang="en-US" dirty="0"/>
           </a:p>
@@ -32924,20 +32974,501 @@
       </p:sp>
       <p:sp>
         <p:nvSpPr>
-          <p:cNvPr id="5" name="Content Placeholder 4"/>
-          <p:cNvSpPr>
-            <a:spLocks noGrp="1"/>
-          </p:cNvSpPr>
-          <p:nvPr>
-            <p:ph idx="1"/>
-          </p:nvPr>
+          <p:cNvPr id="6" name="Rounded Rectangle 5"/>
+          <p:cNvSpPr/>
+          <p:nvPr/>
         </p:nvSpPr>
-        <p:spPr/>
+        <p:spPr>
+          <a:xfrm>
+            <a:off x="827584" y="2057663"/>
+            <a:ext cx="2520280" cy="4176464"/>
+          </a:xfrm>
+          <a:prstGeom prst="roundRect">
+            <a:avLst/>
+          </a:prstGeom>
+        </p:spPr>
+        <p:style>
+          <a:lnRef idx="1">
+            <a:schemeClr val="accent1"/>
+          </a:lnRef>
+          <a:fillRef idx="2">
+            <a:schemeClr val="accent1"/>
+          </a:fillRef>
+          <a:effectRef idx="1">
+            <a:schemeClr val="accent1"/>
+          </a:effectRef>
+          <a:fontRef idx="minor">
+            <a:schemeClr val="dk1"/>
+          </a:fontRef>
+        </p:style>
         <p:txBody>
-          <a:bodyPr/>
+          <a:bodyPr rtlCol="0" anchor="t"/>
           <a:lstStyle/>
           <a:p>
-            <a:endParaRPr lang="en-US"/>
+            <a:pPr algn="ctr"/>
+            <a:r>
+              <a:rPr lang="en-US" dirty="0" smtClean="0">
+                <a:latin typeface="Segoe" charset="0"/>
+                <a:ea typeface="Segoe" charset="0"/>
+                <a:cs typeface="Segoe" charset="0"/>
+              </a:rPr>
+              <a:t>Web server</a:t>
+            </a:r>
+            <a:endParaRPr lang="en-US" dirty="0">
+              <a:latin typeface="Segoe" charset="0"/>
+              <a:ea typeface="Segoe" charset="0"/>
+              <a:cs typeface="Segoe" charset="0"/>
+            </a:endParaRPr>
+          </a:p>
+        </p:txBody>
+      </p:sp>
+      <p:sp>
+        <p:nvSpPr>
+          <p:cNvPr id="7" name="Rounded Rectangle 6"/>
+          <p:cNvSpPr/>
+          <p:nvPr/>
+        </p:nvSpPr>
+        <p:spPr>
+          <a:xfrm>
+            <a:off x="1075420" y="2733355"/>
+            <a:ext cx="2024608" cy="1304528"/>
+          </a:xfrm>
+          <a:prstGeom prst="roundRect">
+            <a:avLst/>
+          </a:prstGeom>
+        </p:spPr>
+        <p:style>
+          <a:lnRef idx="1">
+            <a:schemeClr val="accent3"/>
+          </a:lnRef>
+          <a:fillRef idx="2">
+            <a:schemeClr val="accent3"/>
+          </a:fillRef>
+          <a:effectRef idx="1">
+            <a:schemeClr val="accent3"/>
+          </a:effectRef>
+          <a:fontRef idx="minor">
+            <a:schemeClr val="dk1"/>
+          </a:fontRef>
+        </p:style>
+        <p:txBody>
+          <a:bodyPr rtlCol="0" anchor="ctr"/>
+          <a:lstStyle/>
+          <a:p>
+            <a:pPr algn="ctr"/>
+            <a:r>
+              <a:rPr lang="en-US" dirty="0" smtClean="0">
+                <a:latin typeface="Segoe" charset="0"/>
+                <a:ea typeface="Segoe" charset="0"/>
+                <a:cs typeface="Segoe" charset="0"/>
+              </a:rPr>
+              <a:t>IIS, web application</a:t>
+            </a:r>
+            <a:endParaRPr lang="en-US" dirty="0">
+              <a:latin typeface="Segoe" charset="0"/>
+              <a:ea typeface="Segoe" charset="0"/>
+              <a:cs typeface="Segoe" charset="0"/>
+            </a:endParaRPr>
+          </a:p>
+        </p:txBody>
+      </p:sp>
+      <p:sp>
+        <p:nvSpPr>
+          <p:cNvPr id="8" name="Rounded Rectangle 7"/>
+          <p:cNvSpPr/>
+          <p:nvPr/>
+        </p:nvSpPr>
+        <p:spPr>
+          <a:xfrm>
+            <a:off x="1075420" y="4145895"/>
+            <a:ext cx="2024608" cy="1304528"/>
+          </a:xfrm>
+          <a:prstGeom prst="roundRect">
+            <a:avLst/>
+          </a:prstGeom>
+        </p:spPr>
+        <p:style>
+          <a:lnRef idx="1">
+            <a:schemeClr val="accent2"/>
+          </a:lnRef>
+          <a:fillRef idx="2">
+            <a:schemeClr val="accent2"/>
+          </a:fillRef>
+          <a:effectRef idx="1">
+            <a:schemeClr val="accent2"/>
+          </a:effectRef>
+          <a:fontRef idx="minor">
+            <a:schemeClr val="dk1"/>
+          </a:fontRef>
+        </p:style>
+        <p:txBody>
+          <a:bodyPr rtlCol="0" anchor="ctr"/>
+          <a:lstStyle/>
+          <a:p>
+            <a:pPr algn="ctr"/>
+            <a:r>
+              <a:rPr lang="en-US" smtClean="0">
+                <a:latin typeface="Segoe" charset="0"/>
+                <a:ea typeface="Segoe" charset="0"/>
+                <a:cs typeface="Segoe" charset="0"/>
+              </a:rPr>
+              <a:t>ETW collection agent</a:t>
+            </a:r>
+            <a:endParaRPr lang="en-US" dirty="0">
+              <a:latin typeface="Segoe" charset="0"/>
+              <a:ea typeface="Segoe" charset="0"/>
+              <a:cs typeface="Segoe" charset="0"/>
+            </a:endParaRPr>
+          </a:p>
+        </p:txBody>
+      </p:sp>
+      <p:sp>
+        <p:nvSpPr>
+          <p:cNvPr id="9" name="Can 8"/>
+          <p:cNvSpPr/>
+          <p:nvPr/>
+        </p:nvSpPr>
+        <p:spPr>
+          <a:xfrm>
+            <a:off x="1075420" y="5662255"/>
+            <a:ext cx="2024608" cy="360040"/>
+          </a:xfrm>
+          <a:prstGeom prst="can">
+            <a:avLst/>
+          </a:prstGeom>
+        </p:spPr>
+        <p:style>
+          <a:lnRef idx="1">
+            <a:schemeClr val="dk1"/>
+          </a:lnRef>
+          <a:fillRef idx="2">
+            <a:schemeClr val="dk1"/>
+          </a:fillRef>
+          <a:effectRef idx="1">
+            <a:schemeClr val="dk1"/>
+          </a:effectRef>
+          <a:fontRef idx="minor">
+            <a:schemeClr val="dk1"/>
+          </a:fontRef>
+        </p:style>
+        <p:txBody>
+          <a:bodyPr rtlCol="0" anchor="ctr"/>
+          <a:lstStyle/>
+          <a:p>
+            <a:pPr algn="ctr"/>
+            <a:r>
+              <a:rPr lang="en-US" dirty="0" smtClean="0">
+                <a:latin typeface="Segoe" charset="0"/>
+                <a:ea typeface="Segoe" charset="0"/>
+                <a:cs typeface="Segoe" charset="0"/>
+              </a:rPr>
+              <a:t>On-disk buffer</a:t>
+            </a:r>
+            <a:endParaRPr lang="en-US" dirty="0">
+              <a:latin typeface="Segoe" charset="0"/>
+              <a:ea typeface="Segoe" charset="0"/>
+              <a:cs typeface="Segoe" charset="0"/>
+            </a:endParaRPr>
+          </a:p>
+        </p:txBody>
+      </p:sp>
+      <p:sp>
+        <p:nvSpPr>
+          <p:cNvPr id="12" name="Rounded Rectangle 11"/>
+          <p:cNvSpPr/>
+          <p:nvPr/>
+        </p:nvSpPr>
+        <p:spPr>
+          <a:xfrm>
+            <a:off x="5508104" y="2057663"/>
+            <a:ext cx="2520280" cy="4176464"/>
+          </a:xfrm>
+          <a:prstGeom prst="roundRect">
+            <a:avLst/>
+          </a:prstGeom>
+        </p:spPr>
+        <p:style>
+          <a:lnRef idx="1">
+            <a:schemeClr val="accent1"/>
+          </a:lnRef>
+          <a:fillRef idx="2">
+            <a:schemeClr val="accent1"/>
+          </a:fillRef>
+          <a:effectRef idx="1">
+            <a:schemeClr val="accent1"/>
+          </a:effectRef>
+          <a:fontRef idx="minor">
+            <a:schemeClr val="dk1"/>
+          </a:fontRef>
+        </p:style>
+        <p:txBody>
+          <a:bodyPr rtlCol="0" anchor="t"/>
+          <a:lstStyle/>
+          <a:p>
+            <a:pPr algn="ctr"/>
+            <a:r>
+              <a:rPr lang="en-US" dirty="0" smtClean="0">
+                <a:latin typeface="Segoe" charset="0"/>
+                <a:ea typeface="Segoe" charset="0"/>
+                <a:cs typeface="Segoe" charset="0"/>
+              </a:rPr>
+              <a:t>Analysis system</a:t>
+            </a:r>
+            <a:endParaRPr lang="en-US" dirty="0">
+              <a:latin typeface="Segoe" charset="0"/>
+              <a:ea typeface="Segoe" charset="0"/>
+              <a:cs typeface="Segoe" charset="0"/>
+            </a:endParaRPr>
+          </a:p>
+        </p:txBody>
+      </p:sp>
+      <p:sp>
+        <p:nvSpPr>
+          <p:cNvPr id="13" name="Rounded Rectangle 12"/>
+          <p:cNvSpPr/>
+          <p:nvPr/>
+        </p:nvSpPr>
+        <p:spPr>
+          <a:xfrm>
+            <a:off x="5755940" y="2733355"/>
+            <a:ext cx="2024608" cy="911669"/>
+          </a:xfrm>
+          <a:prstGeom prst="roundRect">
+            <a:avLst/>
+          </a:prstGeom>
+        </p:spPr>
+        <p:style>
+          <a:lnRef idx="1">
+            <a:schemeClr val="accent2"/>
+          </a:lnRef>
+          <a:fillRef idx="2">
+            <a:schemeClr val="accent2"/>
+          </a:fillRef>
+          <a:effectRef idx="1">
+            <a:schemeClr val="accent2"/>
+          </a:effectRef>
+          <a:fontRef idx="minor">
+            <a:schemeClr val="dk1"/>
+          </a:fontRef>
+        </p:style>
+        <p:txBody>
+          <a:bodyPr rtlCol="0" anchor="ctr"/>
+          <a:lstStyle/>
+          <a:p>
+            <a:pPr algn="ctr"/>
+            <a:r>
+              <a:rPr lang="en-US" smtClean="0">
+                <a:latin typeface="Segoe" charset="0"/>
+                <a:ea typeface="Segoe" charset="0"/>
+                <a:cs typeface="Segoe" charset="0"/>
+              </a:rPr>
+              <a:t>Trace file collector</a:t>
+            </a:r>
+            <a:endParaRPr lang="en-US" dirty="0">
+              <a:latin typeface="Segoe" charset="0"/>
+              <a:ea typeface="Segoe" charset="0"/>
+              <a:cs typeface="Segoe" charset="0"/>
+            </a:endParaRPr>
+          </a:p>
+        </p:txBody>
+      </p:sp>
+      <p:sp>
+        <p:nvSpPr>
+          <p:cNvPr id="14" name="Can 13"/>
+          <p:cNvSpPr/>
+          <p:nvPr/>
+        </p:nvSpPr>
+        <p:spPr>
+          <a:xfrm>
+            <a:off x="5755940" y="3797215"/>
+            <a:ext cx="2024608" cy="360040"/>
+          </a:xfrm>
+          <a:prstGeom prst="can">
+            <a:avLst/>
+          </a:prstGeom>
+        </p:spPr>
+        <p:style>
+          <a:lnRef idx="1">
+            <a:schemeClr val="dk1"/>
+          </a:lnRef>
+          <a:fillRef idx="2">
+            <a:schemeClr val="dk1"/>
+          </a:fillRef>
+          <a:effectRef idx="1">
+            <a:schemeClr val="dk1"/>
+          </a:effectRef>
+          <a:fontRef idx="minor">
+            <a:schemeClr val="dk1"/>
+          </a:fontRef>
+        </p:style>
+        <p:txBody>
+          <a:bodyPr rtlCol="0" anchor="ctr"/>
+          <a:lstStyle/>
+          <a:p>
+            <a:pPr algn="ctr"/>
+            <a:r>
+              <a:rPr lang="en-US" dirty="0" smtClean="0">
+                <a:latin typeface="Segoe" charset="0"/>
+                <a:ea typeface="Segoe" charset="0"/>
+                <a:cs typeface="Segoe" charset="0"/>
+              </a:rPr>
+              <a:t>Symbol cache</a:t>
+            </a:r>
+            <a:endParaRPr lang="en-US" dirty="0">
+              <a:latin typeface="Segoe" charset="0"/>
+              <a:ea typeface="Segoe" charset="0"/>
+              <a:cs typeface="Segoe" charset="0"/>
+            </a:endParaRPr>
+          </a:p>
+        </p:txBody>
+      </p:sp>
+      <p:sp>
+        <p:nvSpPr>
+          <p:cNvPr id="15" name="Can 14"/>
+          <p:cNvSpPr/>
+          <p:nvPr/>
+        </p:nvSpPr>
+        <p:spPr>
+          <a:xfrm>
+            <a:off x="5755940" y="4309446"/>
+            <a:ext cx="2024608" cy="360040"/>
+          </a:xfrm>
+          <a:prstGeom prst="can">
+            <a:avLst/>
+          </a:prstGeom>
+        </p:spPr>
+        <p:style>
+          <a:lnRef idx="1">
+            <a:schemeClr val="dk1"/>
+          </a:lnRef>
+          <a:fillRef idx="2">
+            <a:schemeClr val="dk1"/>
+          </a:fillRef>
+          <a:effectRef idx="1">
+            <a:schemeClr val="dk1"/>
+          </a:effectRef>
+          <a:fontRef idx="minor">
+            <a:schemeClr val="dk1"/>
+          </a:fontRef>
+        </p:style>
+        <p:txBody>
+          <a:bodyPr rtlCol="0" anchor="ctr"/>
+          <a:lstStyle/>
+          <a:p>
+            <a:pPr algn="ctr"/>
+            <a:r>
+              <a:rPr lang="en-US" dirty="0" smtClean="0">
+                <a:latin typeface="Segoe" charset="0"/>
+                <a:ea typeface="Segoe" charset="0"/>
+                <a:cs typeface="Segoe" charset="0"/>
+              </a:rPr>
+              <a:t>Trace cache</a:t>
+            </a:r>
+            <a:endParaRPr lang="en-US" dirty="0">
+              <a:latin typeface="Segoe" charset="0"/>
+              <a:ea typeface="Segoe" charset="0"/>
+              <a:cs typeface="Segoe" charset="0"/>
+            </a:endParaRPr>
+          </a:p>
+        </p:txBody>
+      </p:sp>
+      <p:sp>
+        <p:nvSpPr>
+          <p:cNvPr id="16" name="Can 15"/>
+          <p:cNvSpPr/>
+          <p:nvPr/>
+        </p:nvSpPr>
+        <p:spPr>
+          <a:xfrm>
+            <a:off x="5755940" y="4818014"/>
+            <a:ext cx="2024608" cy="360040"/>
+          </a:xfrm>
+          <a:prstGeom prst="can">
+            <a:avLst/>
+          </a:prstGeom>
+        </p:spPr>
+        <p:style>
+          <a:lnRef idx="1">
+            <a:schemeClr val="dk1"/>
+          </a:lnRef>
+          <a:fillRef idx="2">
+            <a:schemeClr val="dk1"/>
+          </a:fillRef>
+          <a:effectRef idx="1">
+            <a:schemeClr val="dk1"/>
+          </a:effectRef>
+          <a:fontRef idx="minor">
+            <a:schemeClr val="dk1"/>
+          </a:fontRef>
+        </p:style>
+        <p:txBody>
+          <a:bodyPr rtlCol="0" anchor="ctr"/>
+          <a:lstStyle/>
+          <a:p>
+            <a:pPr algn="ctr"/>
+            <a:r>
+              <a:rPr lang="en-US" dirty="0" smtClean="0">
+                <a:latin typeface="Segoe" charset="0"/>
+                <a:ea typeface="Segoe" charset="0"/>
+                <a:cs typeface="Segoe" charset="0"/>
+              </a:rPr>
+              <a:t>Stack report files</a:t>
+            </a:r>
+            <a:endParaRPr lang="en-US" dirty="0">
+              <a:latin typeface="Segoe" charset="0"/>
+              <a:ea typeface="Segoe" charset="0"/>
+              <a:cs typeface="Segoe" charset="0"/>
+            </a:endParaRPr>
+          </a:p>
+        </p:txBody>
+      </p:sp>
+      <p:sp>
+        <p:nvSpPr>
+          <p:cNvPr id="17" name="Rounded Rectangle 16"/>
+          <p:cNvSpPr/>
+          <p:nvPr/>
+        </p:nvSpPr>
+        <p:spPr>
+          <a:xfrm>
+            <a:off x="5796136" y="5466213"/>
+            <a:ext cx="2024608" cy="544051"/>
+          </a:xfrm>
+          <a:prstGeom prst="roundRect">
+            <a:avLst/>
+          </a:prstGeom>
+        </p:spPr>
+        <p:style>
+          <a:lnRef idx="1">
+            <a:schemeClr val="accent2"/>
+          </a:lnRef>
+          <a:fillRef idx="2">
+            <a:schemeClr val="accent2"/>
+          </a:fillRef>
+          <a:effectRef idx="1">
+            <a:schemeClr val="accent2"/>
+          </a:effectRef>
+          <a:fontRef idx="minor">
+            <a:schemeClr val="dk1"/>
+          </a:fontRef>
+        </p:style>
+        <p:txBody>
+          <a:bodyPr rtlCol="0" anchor="ctr"/>
+          <a:lstStyle/>
+          <a:p>
+            <a:pPr algn="ctr"/>
+            <a:r>
+              <a:rPr lang="en-US" dirty="0" smtClean="0">
+                <a:latin typeface="Segoe" charset="0"/>
+                <a:ea typeface="Segoe" charset="0"/>
+                <a:cs typeface="Segoe" charset="0"/>
+              </a:rPr>
+              <a:t>Alerting</a:t>
+            </a:r>
+            <a:endParaRPr lang="en-US" dirty="0">
+              <a:latin typeface="Segoe" charset="0"/>
+              <a:ea typeface="Segoe" charset="0"/>
+              <a:cs typeface="Segoe" charset="0"/>
+            </a:endParaRPr>
           </a:p>
         </p:txBody>
       </p:sp>
@@ -33058,6 +33589,106 @@
       </p:grpSpPr>
       <p:sp>
         <p:nvSpPr>
+          <p:cNvPr id="9" name="Rounded Rectangle 8"/>
+          <p:cNvSpPr/>
+          <p:nvPr/>
+        </p:nvSpPr>
+        <p:spPr>
+          <a:xfrm>
+            <a:off x="1363452" y="2152245"/>
+            <a:ext cx="2520280" cy="2445087"/>
+          </a:xfrm>
+          <a:prstGeom prst="roundRect">
+            <a:avLst/>
+          </a:prstGeom>
+        </p:spPr>
+        <p:style>
+          <a:lnRef idx="1">
+            <a:schemeClr val="accent1"/>
+          </a:lnRef>
+          <a:fillRef idx="2">
+            <a:schemeClr val="accent1"/>
+          </a:fillRef>
+          <a:effectRef idx="1">
+            <a:schemeClr val="accent1"/>
+          </a:effectRef>
+          <a:fontRef idx="minor">
+            <a:schemeClr val="dk1"/>
+          </a:fontRef>
+        </p:style>
+        <p:txBody>
+          <a:bodyPr rtlCol="0" anchor="t"/>
+          <a:lstStyle/>
+          <a:p>
+            <a:pPr algn="ctr"/>
+            <a:r>
+              <a:rPr lang="en-US" smtClean="0">
+                <a:latin typeface="Segoe" charset="0"/>
+                <a:ea typeface="Segoe" charset="0"/>
+                <a:cs typeface="Segoe" charset="0"/>
+              </a:rPr>
+              <a:t>End-user system</a:t>
+            </a:r>
+            <a:endParaRPr lang="en-US" dirty="0">
+              <a:latin typeface="Segoe" charset="0"/>
+              <a:ea typeface="Segoe" charset="0"/>
+              <a:cs typeface="Segoe" charset="0"/>
+            </a:endParaRPr>
+          </a:p>
+        </p:txBody>
+      </p:sp>
+      <p:sp>
+        <p:nvSpPr>
+          <p:cNvPr id="8" name="Rounded Rectangle 7"/>
+          <p:cNvSpPr/>
+          <p:nvPr/>
+        </p:nvSpPr>
+        <p:spPr>
+          <a:xfrm>
+            <a:off x="1115616" y="2564904"/>
+            <a:ext cx="2520280" cy="2445087"/>
+          </a:xfrm>
+          <a:prstGeom prst="roundRect">
+            <a:avLst/>
+          </a:prstGeom>
+        </p:spPr>
+        <p:style>
+          <a:lnRef idx="1">
+            <a:schemeClr val="accent1"/>
+          </a:lnRef>
+          <a:fillRef idx="2">
+            <a:schemeClr val="accent1"/>
+          </a:fillRef>
+          <a:effectRef idx="1">
+            <a:schemeClr val="accent1"/>
+          </a:effectRef>
+          <a:fontRef idx="minor">
+            <a:schemeClr val="dk1"/>
+          </a:fontRef>
+        </p:style>
+        <p:txBody>
+          <a:bodyPr rtlCol="0" anchor="t"/>
+          <a:lstStyle/>
+          <a:p>
+            <a:pPr algn="ctr"/>
+            <a:r>
+              <a:rPr lang="en-US" smtClean="0">
+                <a:latin typeface="Segoe" charset="0"/>
+                <a:ea typeface="Segoe" charset="0"/>
+                <a:cs typeface="Segoe" charset="0"/>
+              </a:rPr>
+              <a:t>End-user system</a:t>
+            </a:r>
+            <a:endParaRPr lang="en-US" dirty="0">
+              <a:latin typeface="Segoe" charset="0"/>
+              <a:ea typeface="Segoe" charset="0"/>
+              <a:cs typeface="Segoe" charset="0"/>
+            </a:endParaRPr>
+          </a:p>
+        </p:txBody>
+      </p:sp>
+      <p:sp>
+        <p:nvSpPr>
           <p:cNvPr id="2" name="Title 1"/>
           <p:cNvSpPr>
             <a:spLocks noGrp="1"/>
@@ -33072,12 +33703,8 @@
           <a:lstStyle/>
           <a:p>
             <a:r>
-              <a:rPr lang="en-US" dirty="0" err="1" smtClean="0"/>
-              <a:t>Aternity</a:t>
-            </a:r>
-            <a:r>
               <a:rPr lang="en-US" dirty="0" smtClean="0"/>
-              <a:t> Boot Performance Analyzer</a:t>
+              <a:t>Client2 Boot Performance Analyzer</a:t>
             </a:r>
             <a:endParaRPr lang="en-US" dirty="0"/>
           </a:p>
@@ -33085,23 +33712,388 @@
       </p:sp>
       <p:sp>
         <p:nvSpPr>
-          <p:cNvPr id="3" name="Content Placeholder 2"/>
-          <p:cNvSpPr>
-            <a:spLocks noGrp="1"/>
-          </p:cNvSpPr>
-          <p:nvPr>
-            <p:ph idx="1"/>
-          </p:nvPr>
+          <p:cNvPr id="4" name="Rounded Rectangle 3"/>
+          <p:cNvSpPr/>
+          <p:nvPr/>
         </p:nvSpPr>
-        <p:spPr/>
+        <p:spPr>
+          <a:xfrm>
+            <a:off x="867780" y="2977563"/>
+            <a:ext cx="2520280" cy="2445087"/>
+          </a:xfrm>
+          <a:prstGeom prst="roundRect">
+            <a:avLst/>
+          </a:prstGeom>
+        </p:spPr>
+        <p:style>
+          <a:lnRef idx="1">
+            <a:schemeClr val="accent1"/>
+          </a:lnRef>
+          <a:fillRef idx="2">
+            <a:schemeClr val="accent1"/>
+          </a:fillRef>
+          <a:effectRef idx="1">
+            <a:schemeClr val="accent1"/>
+          </a:effectRef>
+          <a:fontRef idx="minor">
+            <a:schemeClr val="dk1"/>
+          </a:fontRef>
+        </p:style>
         <p:txBody>
-          <a:bodyPr/>
+          <a:bodyPr rtlCol="0" anchor="t"/>
           <a:lstStyle/>
           <a:p>
-            <a:endParaRPr lang="en-US"/>
+            <a:pPr algn="ctr"/>
+            <a:r>
+              <a:rPr lang="en-US" smtClean="0">
+                <a:latin typeface="Segoe" charset="0"/>
+                <a:ea typeface="Segoe" charset="0"/>
+                <a:cs typeface="Segoe" charset="0"/>
+              </a:rPr>
+              <a:t>End-user system</a:t>
+            </a:r>
+            <a:endParaRPr lang="en-US" dirty="0">
+              <a:latin typeface="Segoe" charset="0"/>
+              <a:ea typeface="Segoe" charset="0"/>
+              <a:cs typeface="Segoe" charset="0"/>
+            </a:endParaRPr>
           </a:p>
         </p:txBody>
       </p:sp>
+      <p:sp>
+        <p:nvSpPr>
+          <p:cNvPr id="5" name="Rounded Rectangle 4"/>
+          <p:cNvSpPr/>
+          <p:nvPr/>
+        </p:nvSpPr>
+        <p:spPr>
+          <a:xfrm>
+            <a:off x="1115616" y="3625635"/>
+            <a:ext cx="2024608" cy="576065"/>
+          </a:xfrm>
+          <a:prstGeom prst="roundRect">
+            <a:avLst/>
+          </a:prstGeom>
+        </p:spPr>
+        <p:style>
+          <a:lnRef idx="1">
+            <a:schemeClr val="accent2"/>
+          </a:lnRef>
+          <a:fillRef idx="2">
+            <a:schemeClr val="accent2"/>
+          </a:fillRef>
+          <a:effectRef idx="1">
+            <a:schemeClr val="accent2"/>
+          </a:effectRef>
+          <a:fontRef idx="minor">
+            <a:schemeClr val="dk1"/>
+          </a:fontRef>
+        </p:style>
+        <p:txBody>
+          <a:bodyPr rtlCol="0" anchor="ctr"/>
+          <a:lstStyle/>
+          <a:p>
+            <a:pPr algn="ctr"/>
+            <a:r>
+              <a:rPr lang="en-US" dirty="0" smtClean="0">
+                <a:latin typeface="Segoe" charset="0"/>
+                <a:ea typeface="Segoe" charset="0"/>
+                <a:cs typeface="Segoe" charset="0"/>
+              </a:rPr>
+              <a:t>Boot </a:t>
+            </a:r>
+            <a:r>
+              <a:rPr lang="en-US" smtClean="0">
+                <a:latin typeface="Segoe" charset="0"/>
+                <a:ea typeface="Segoe" charset="0"/>
+                <a:cs typeface="Segoe" charset="0"/>
+              </a:rPr>
+              <a:t>collection agent</a:t>
+            </a:r>
+            <a:endParaRPr lang="en-US" dirty="0">
+              <a:latin typeface="Segoe" charset="0"/>
+              <a:ea typeface="Segoe" charset="0"/>
+              <a:cs typeface="Segoe" charset="0"/>
+            </a:endParaRPr>
+          </a:p>
+        </p:txBody>
+      </p:sp>
+      <p:sp>
+        <p:nvSpPr>
+          <p:cNvPr id="6" name="Can 5"/>
+          <p:cNvSpPr/>
+          <p:nvPr/>
+        </p:nvSpPr>
+        <p:spPr>
+          <a:xfrm>
+            <a:off x="1115616" y="4971599"/>
+            <a:ext cx="2024608" cy="360040"/>
+          </a:xfrm>
+          <a:prstGeom prst="can">
+            <a:avLst/>
+          </a:prstGeom>
+        </p:spPr>
+        <p:style>
+          <a:lnRef idx="1">
+            <a:schemeClr val="dk1"/>
+          </a:lnRef>
+          <a:fillRef idx="2">
+            <a:schemeClr val="dk1"/>
+          </a:fillRef>
+          <a:effectRef idx="1">
+            <a:schemeClr val="dk1"/>
+          </a:effectRef>
+          <a:fontRef idx="minor">
+            <a:schemeClr val="dk1"/>
+          </a:fontRef>
+        </p:style>
+        <p:txBody>
+          <a:bodyPr rtlCol="0" anchor="ctr"/>
+          <a:lstStyle/>
+          <a:p>
+            <a:pPr algn="ctr"/>
+            <a:r>
+              <a:rPr lang="en-US" dirty="0" err="1" smtClean="0">
+                <a:latin typeface="Segoe" charset="0"/>
+                <a:ea typeface="Segoe" charset="0"/>
+                <a:cs typeface="Segoe" charset="0"/>
+              </a:rPr>
+              <a:t>AutoLogger</a:t>
+            </a:r>
+            <a:r>
+              <a:rPr lang="en-US" dirty="0" smtClean="0">
+                <a:latin typeface="Segoe" charset="0"/>
+                <a:ea typeface="Segoe" charset="0"/>
+                <a:cs typeface="Segoe" charset="0"/>
+              </a:rPr>
+              <a:t> </a:t>
+            </a:r>
+            <a:r>
+              <a:rPr lang="en-US" b="1" dirty="0" smtClean="0">
+                <a:latin typeface="Segoe" charset="0"/>
+                <a:ea typeface="Segoe" charset="0"/>
+                <a:cs typeface="Segoe" charset="0"/>
+              </a:rPr>
+              <a:t>.</a:t>
+            </a:r>
+            <a:r>
+              <a:rPr lang="en-US" b="1" dirty="0" err="1" smtClean="0">
+                <a:latin typeface="Segoe" charset="0"/>
+                <a:ea typeface="Segoe" charset="0"/>
+                <a:cs typeface="Segoe" charset="0"/>
+              </a:rPr>
+              <a:t>etl</a:t>
+            </a:r>
+            <a:endParaRPr lang="en-US" b="1" dirty="0">
+              <a:latin typeface="Segoe" charset="0"/>
+              <a:ea typeface="Segoe" charset="0"/>
+              <a:cs typeface="Segoe" charset="0"/>
+            </a:endParaRPr>
+          </a:p>
+        </p:txBody>
+      </p:sp>
+      <p:sp>
+        <p:nvSpPr>
+          <p:cNvPr id="7" name="Rounded Rectangle 6"/>
+          <p:cNvSpPr/>
+          <p:nvPr/>
+        </p:nvSpPr>
+        <p:spPr>
+          <a:xfrm>
+            <a:off x="1115616" y="4273707"/>
+            <a:ext cx="2024608" cy="576065"/>
+          </a:xfrm>
+          <a:prstGeom prst="roundRect">
+            <a:avLst/>
+          </a:prstGeom>
+        </p:spPr>
+        <p:style>
+          <a:lnRef idx="1">
+            <a:schemeClr val="accent2"/>
+          </a:lnRef>
+          <a:fillRef idx="2">
+            <a:schemeClr val="accent2"/>
+          </a:fillRef>
+          <a:effectRef idx="1">
+            <a:schemeClr val="accent2"/>
+          </a:effectRef>
+          <a:fontRef idx="minor">
+            <a:schemeClr val="dk1"/>
+          </a:fontRef>
+        </p:style>
+        <p:txBody>
+          <a:bodyPr rtlCol="0" anchor="ctr"/>
+          <a:lstStyle/>
+          <a:p>
+            <a:pPr algn="ctr"/>
+            <a:r>
+              <a:rPr lang="en-US" dirty="0" smtClean="0">
+                <a:latin typeface="Segoe" charset="0"/>
+                <a:ea typeface="Segoe" charset="0"/>
+                <a:cs typeface="Segoe" charset="0"/>
+              </a:rPr>
+              <a:t>Post-boot trace analyzer</a:t>
+            </a:r>
+            <a:endParaRPr lang="en-US" dirty="0">
+              <a:latin typeface="Segoe" charset="0"/>
+              <a:ea typeface="Segoe" charset="0"/>
+              <a:cs typeface="Segoe" charset="0"/>
+            </a:endParaRPr>
+          </a:p>
+        </p:txBody>
+      </p:sp>
+      <p:sp>
+        <p:nvSpPr>
+          <p:cNvPr id="10" name="Rounded Rectangle 9"/>
+          <p:cNvSpPr/>
+          <p:nvPr/>
+        </p:nvSpPr>
+        <p:spPr>
+          <a:xfrm>
+            <a:off x="5508104" y="2057663"/>
+            <a:ext cx="2520280" cy="4176464"/>
+          </a:xfrm>
+          <a:prstGeom prst="roundRect">
+            <a:avLst/>
+          </a:prstGeom>
+        </p:spPr>
+        <p:style>
+          <a:lnRef idx="1">
+            <a:schemeClr val="accent1"/>
+          </a:lnRef>
+          <a:fillRef idx="2">
+            <a:schemeClr val="accent1"/>
+          </a:fillRef>
+          <a:effectRef idx="1">
+            <a:schemeClr val="accent1"/>
+          </a:effectRef>
+          <a:fontRef idx="minor">
+            <a:schemeClr val="dk1"/>
+          </a:fontRef>
+        </p:style>
+        <p:txBody>
+          <a:bodyPr rtlCol="0" anchor="t"/>
+          <a:lstStyle/>
+          <a:p>
+            <a:pPr algn="ctr"/>
+            <a:r>
+              <a:rPr lang="en-US" dirty="0" smtClean="0">
+                <a:latin typeface="Segoe" charset="0"/>
+                <a:ea typeface="Segoe" charset="0"/>
+                <a:cs typeface="Segoe" charset="0"/>
+              </a:rPr>
+              <a:t>Reporting dashboard</a:t>
+            </a:r>
+            <a:endParaRPr lang="en-US" dirty="0">
+              <a:latin typeface="Segoe" charset="0"/>
+              <a:ea typeface="Segoe" charset="0"/>
+              <a:cs typeface="Segoe" charset="0"/>
+            </a:endParaRPr>
+          </a:p>
+        </p:txBody>
+      </p:sp>
+      <p:pic>
+        <p:nvPicPr>
+          <p:cNvPr id="11" name="Picture 10"/>
+          <p:cNvPicPr>
+            <a:picLocks noChangeAspect="1"/>
+          </p:cNvPicPr>
+          <p:nvPr/>
+        </p:nvPicPr>
+        <p:blipFill>
+          <a:blip r:embed="rId2"/>
+          <a:stretch>
+            <a:fillRect/>
+          </a:stretch>
+        </p:blipFill>
+        <p:spPr>
+          <a:xfrm>
+            <a:off x="5727690" y="3205828"/>
+            <a:ext cx="2048024" cy="388676"/>
+          </a:xfrm>
+          <a:prstGeom prst="rect">
+            <a:avLst/>
+          </a:prstGeom>
+          <a:ln>
+            <a:noFill/>
+          </a:ln>
+          <a:effectLst>
+            <a:outerShdw blurRad="292100" dist="139700" dir="2700000" algn="tl" rotWithShape="0">
+              <a:srgbClr val="333333">
+                <a:alpha val="65000"/>
+              </a:srgbClr>
+            </a:outerShdw>
+          </a:effectLst>
+        </p:spPr>
+      </p:pic>
+      <p:pic>
+        <p:nvPicPr>
+          <p:cNvPr id="12" name="Picture 11"/>
+          <p:cNvPicPr>
+            <a:picLocks noChangeAspect="1"/>
+          </p:cNvPicPr>
+          <p:nvPr/>
+        </p:nvPicPr>
+        <p:blipFill>
+          <a:blip r:embed="rId2"/>
+          <a:stretch>
+            <a:fillRect/>
+          </a:stretch>
+        </p:blipFill>
+        <p:spPr>
+          <a:xfrm>
+            <a:off x="5744232" y="3771330"/>
+            <a:ext cx="2048024" cy="388676"/>
+          </a:xfrm>
+          <a:prstGeom prst="rect">
+            <a:avLst/>
+          </a:prstGeom>
+          <a:ln>
+            <a:noFill/>
+          </a:ln>
+          <a:effectLst>
+            <a:outerShdw blurRad="292100" dist="139700" dir="2700000" algn="tl" rotWithShape="0">
+              <a:srgbClr val="333333">
+                <a:alpha val="65000"/>
+              </a:srgbClr>
+            </a:outerShdw>
+          </a:effectLst>
+        </p:spPr>
+      </p:pic>
+      <p:pic>
+        <p:nvPicPr>
+          <p:cNvPr id="13" name="Picture 12"/>
+          <p:cNvPicPr>
+            <a:picLocks noChangeAspect="1"/>
+          </p:cNvPicPr>
+          <p:nvPr/>
+        </p:nvPicPr>
+        <p:blipFill>
+          <a:blip r:embed="rId2"/>
+          <a:stretch>
+            <a:fillRect/>
+          </a:stretch>
+        </p:blipFill>
+        <p:spPr>
+          <a:xfrm>
+            <a:off x="5727690" y="4336468"/>
+            <a:ext cx="2048024" cy="388676"/>
+          </a:xfrm>
+          <a:prstGeom prst="rect">
+            <a:avLst/>
+          </a:prstGeom>
+          <a:ln>
+            <a:noFill/>
+          </a:ln>
+          <a:effectLst>
+            <a:outerShdw blurRad="292100" dist="139700" dir="2700000" algn="tl" rotWithShape="0">
+              <a:srgbClr val="333333">
+                <a:alpha val="65000"/>
+              </a:srgbClr>
+            </a:outerShdw>
+          </a:effectLst>
+        </p:spPr>
+      </p:pic>
     </p:spTree>
     <p:extLst>
       <p:ext uri="{BB962C8B-B14F-4D97-AF65-F5344CB8AC3E}">
@@ -37592,13 +38584,16 @@
             </a:r>
             <a:r>
               <a:rPr lang="en-US" dirty="0" smtClean="0"/>
-              <a:t>[0</a:t>
-            </a:r>
-            <a:r>
-              <a:rPr lang="en-US" smtClean="0"/>
-              <a:t>].CreateRuntime();</a:t>
-            </a:r>
-            <a:endParaRPr lang="en-US" dirty="0" smtClean="0"/>
+              <a:t>[0].</a:t>
+            </a:r>
+            <a:r>
+              <a:rPr lang="en-US" dirty="0" err="1" smtClean="0"/>
+              <a:t>CreateRuntime</a:t>
+            </a:r>
+            <a:r>
+              <a:rPr lang="en-US" dirty="0" smtClean="0"/>
+              <a:t>();</a:t>
+            </a:r>
           </a:p>
           <a:p>
             <a:endParaRPr lang="en-US" dirty="0"/>
@@ -38385,7 +39380,7 @@
           <a:p>
             <a:r>
               <a:rPr lang="en-US" dirty="0" smtClean="0"/>
-              <a:t>Dump Analysis Portal</a:t>
+              <a:t>Client3 Dump Analysis Portal</a:t>
             </a:r>
             <a:endParaRPr lang="en-US" dirty="0"/>
           </a:p>
@@ -38393,20 +39388,624 @@
       </p:sp>
       <p:sp>
         <p:nvSpPr>
-          <p:cNvPr id="6" name="Content Placeholder 5"/>
-          <p:cNvSpPr>
-            <a:spLocks noGrp="1"/>
-          </p:cNvSpPr>
-          <p:nvPr>
-            <p:ph idx="1"/>
-          </p:nvPr>
+          <p:cNvPr id="10" name="Rounded Rectangle 9"/>
+          <p:cNvSpPr/>
+          <p:nvPr/>
         </p:nvSpPr>
-        <p:spPr/>
+        <p:spPr>
+          <a:xfrm>
+            <a:off x="1369120" y="2075461"/>
+            <a:ext cx="2520280" cy="2445087"/>
+          </a:xfrm>
+          <a:prstGeom prst="roundRect">
+            <a:avLst/>
+          </a:prstGeom>
+        </p:spPr>
+        <p:style>
+          <a:lnRef idx="1">
+            <a:schemeClr val="accent1"/>
+          </a:lnRef>
+          <a:fillRef idx="2">
+            <a:schemeClr val="accent1"/>
+          </a:fillRef>
+          <a:effectRef idx="1">
+            <a:schemeClr val="accent1"/>
+          </a:effectRef>
+          <a:fontRef idx="minor">
+            <a:schemeClr val="dk1"/>
+          </a:fontRef>
+        </p:style>
         <p:txBody>
-          <a:bodyPr/>
+          <a:bodyPr rtlCol="0" anchor="t"/>
           <a:lstStyle/>
           <a:p>
-            <a:endParaRPr lang="en-US"/>
+            <a:pPr algn="ctr"/>
+            <a:r>
+              <a:rPr lang="en-US" dirty="0" smtClean="0">
+                <a:latin typeface="Segoe" charset="0"/>
+                <a:ea typeface="Segoe" charset="0"/>
+                <a:cs typeface="Segoe" charset="0"/>
+              </a:rPr>
+              <a:t>Production server</a:t>
+            </a:r>
+            <a:endParaRPr lang="en-US" dirty="0">
+              <a:latin typeface="Segoe" charset="0"/>
+              <a:ea typeface="Segoe" charset="0"/>
+              <a:cs typeface="Segoe" charset="0"/>
+            </a:endParaRPr>
+          </a:p>
+        </p:txBody>
+      </p:sp>
+      <p:sp>
+        <p:nvSpPr>
+          <p:cNvPr id="11" name="Rounded Rectangle 10"/>
+          <p:cNvSpPr/>
+          <p:nvPr/>
+        </p:nvSpPr>
+        <p:spPr>
+          <a:xfrm>
+            <a:off x="1118450" y="2526512"/>
+            <a:ext cx="2520280" cy="2445087"/>
+          </a:xfrm>
+          <a:prstGeom prst="roundRect">
+            <a:avLst/>
+          </a:prstGeom>
+        </p:spPr>
+        <p:style>
+          <a:lnRef idx="1">
+            <a:schemeClr val="accent1"/>
+          </a:lnRef>
+          <a:fillRef idx="2">
+            <a:schemeClr val="accent1"/>
+          </a:fillRef>
+          <a:effectRef idx="1">
+            <a:schemeClr val="accent1"/>
+          </a:effectRef>
+          <a:fontRef idx="minor">
+            <a:schemeClr val="dk1"/>
+          </a:fontRef>
+        </p:style>
+        <p:txBody>
+          <a:bodyPr rtlCol="0" anchor="t"/>
+          <a:lstStyle/>
+          <a:p>
+            <a:pPr algn="ctr"/>
+            <a:r>
+              <a:rPr lang="en-US" dirty="0" smtClean="0">
+                <a:latin typeface="Segoe" charset="0"/>
+                <a:ea typeface="Segoe" charset="0"/>
+                <a:cs typeface="Segoe" charset="0"/>
+              </a:rPr>
+              <a:t>Production server</a:t>
+            </a:r>
+            <a:endParaRPr lang="en-US" dirty="0">
+              <a:latin typeface="Segoe" charset="0"/>
+              <a:ea typeface="Segoe" charset="0"/>
+              <a:cs typeface="Segoe" charset="0"/>
+            </a:endParaRPr>
+          </a:p>
+        </p:txBody>
+      </p:sp>
+      <p:sp>
+        <p:nvSpPr>
+          <p:cNvPr id="12" name="Rounded Rectangle 11"/>
+          <p:cNvSpPr/>
+          <p:nvPr/>
+        </p:nvSpPr>
+        <p:spPr>
+          <a:xfrm>
+            <a:off x="867780" y="2977563"/>
+            <a:ext cx="2520280" cy="2445087"/>
+          </a:xfrm>
+          <a:prstGeom prst="roundRect">
+            <a:avLst/>
+          </a:prstGeom>
+        </p:spPr>
+        <p:style>
+          <a:lnRef idx="1">
+            <a:schemeClr val="accent1"/>
+          </a:lnRef>
+          <a:fillRef idx="2">
+            <a:schemeClr val="accent1"/>
+          </a:fillRef>
+          <a:effectRef idx="1">
+            <a:schemeClr val="accent1"/>
+          </a:effectRef>
+          <a:fontRef idx="minor">
+            <a:schemeClr val="dk1"/>
+          </a:fontRef>
+        </p:style>
+        <p:txBody>
+          <a:bodyPr rtlCol="0" anchor="t"/>
+          <a:lstStyle/>
+          <a:p>
+            <a:pPr algn="ctr"/>
+            <a:r>
+              <a:rPr lang="en-US" dirty="0" smtClean="0">
+                <a:latin typeface="Segoe" charset="0"/>
+                <a:ea typeface="Segoe" charset="0"/>
+                <a:cs typeface="Segoe" charset="0"/>
+              </a:rPr>
+              <a:t>Production server</a:t>
+            </a:r>
+            <a:endParaRPr lang="en-US" dirty="0">
+              <a:latin typeface="Segoe" charset="0"/>
+              <a:ea typeface="Segoe" charset="0"/>
+              <a:cs typeface="Segoe" charset="0"/>
+            </a:endParaRPr>
+          </a:p>
+        </p:txBody>
+      </p:sp>
+      <p:sp>
+        <p:nvSpPr>
+          <p:cNvPr id="13" name="Rounded Rectangle 12"/>
+          <p:cNvSpPr/>
+          <p:nvPr/>
+        </p:nvSpPr>
+        <p:spPr>
+          <a:xfrm>
+            <a:off x="1115616" y="3501008"/>
+            <a:ext cx="2024608" cy="667461"/>
+          </a:xfrm>
+          <a:prstGeom prst="roundRect">
+            <a:avLst/>
+          </a:prstGeom>
+        </p:spPr>
+        <p:style>
+          <a:lnRef idx="1">
+            <a:schemeClr val="accent3"/>
+          </a:lnRef>
+          <a:fillRef idx="2">
+            <a:schemeClr val="accent3"/>
+          </a:fillRef>
+          <a:effectRef idx="1">
+            <a:schemeClr val="accent3"/>
+          </a:effectRef>
+          <a:fontRef idx="minor">
+            <a:schemeClr val="dk1"/>
+          </a:fontRef>
+        </p:style>
+        <p:txBody>
+          <a:bodyPr rtlCol="0" anchor="ctr"/>
+          <a:lstStyle/>
+          <a:p>
+            <a:pPr algn="ctr"/>
+            <a:r>
+              <a:rPr lang="en-US" smtClean="0">
+                <a:latin typeface="Segoe" charset="0"/>
+                <a:ea typeface="Segoe" charset="0"/>
+                <a:cs typeface="Segoe" charset="0"/>
+              </a:rPr>
+              <a:t>Application</a:t>
+            </a:r>
+            <a:endParaRPr lang="en-US" dirty="0">
+              <a:latin typeface="Segoe" charset="0"/>
+              <a:ea typeface="Segoe" charset="0"/>
+              <a:cs typeface="Segoe" charset="0"/>
+            </a:endParaRPr>
+          </a:p>
+        </p:txBody>
+      </p:sp>
+      <p:sp>
+        <p:nvSpPr>
+          <p:cNvPr id="14" name="Can 13"/>
+          <p:cNvSpPr/>
+          <p:nvPr/>
+        </p:nvSpPr>
+        <p:spPr>
+          <a:xfrm>
+            <a:off x="1115616" y="4971599"/>
+            <a:ext cx="2024608" cy="360040"/>
+          </a:xfrm>
+          <a:prstGeom prst="can">
+            <a:avLst/>
+          </a:prstGeom>
+        </p:spPr>
+        <p:style>
+          <a:lnRef idx="1">
+            <a:schemeClr val="dk1"/>
+          </a:lnRef>
+          <a:fillRef idx="2">
+            <a:schemeClr val="dk1"/>
+          </a:fillRef>
+          <a:effectRef idx="1">
+            <a:schemeClr val="dk1"/>
+          </a:effectRef>
+          <a:fontRef idx="minor">
+            <a:schemeClr val="dk1"/>
+          </a:fontRef>
+        </p:style>
+        <p:txBody>
+          <a:bodyPr rtlCol="0" anchor="ctr"/>
+          <a:lstStyle/>
+          <a:p>
+            <a:pPr algn="ctr"/>
+            <a:r>
+              <a:rPr lang="en-US" dirty="0" smtClean="0">
+                <a:latin typeface="Segoe" charset="0"/>
+                <a:ea typeface="Segoe" charset="0"/>
+                <a:cs typeface="Segoe" charset="0"/>
+              </a:rPr>
+              <a:t>WER </a:t>
+            </a:r>
+            <a:r>
+              <a:rPr lang="en-US" b="1" dirty="0" smtClean="0">
+                <a:latin typeface="Segoe" charset="0"/>
+                <a:ea typeface="Segoe" charset="0"/>
+                <a:cs typeface="Segoe" charset="0"/>
+              </a:rPr>
+              <a:t>.</a:t>
+            </a:r>
+            <a:r>
+              <a:rPr lang="en-US" b="1" dirty="0" err="1" smtClean="0">
+                <a:latin typeface="Segoe" charset="0"/>
+                <a:ea typeface="Segoe" charset="0"/>
+                <a:cs typeface="Segoe" charset="0"/>
+              </a:rPr>
+              <a:t>dmp</a:t>
+            </a:r>
+            <a:r>
+              <a:rPr lang="en-US" dirty="0" smtClean="0">
+                <a:latin typeface="Segoe" charset="0"/>
+                <a:ea typeface="Segoe" charset="0"/>
+                <a:cs typeface="Segoe" charset="0"/>
+              </a:rPr>
+              <a:t> files</a:t>
+            </a:r>
+            <a:endParaRPr lang="en-US" b="1" dirty="0">
+              <a:latin typeface="Segoe" charset="0"/>
+              <a:ea typeface="Segoe" charset="0"/>
+              <a:cs typeface="Segoe" charset="0"/>
+            </a:endParaRPr>
+          </a:p>
+        </p:txBody>
+      </p:sp>
+      <p:sp>
+        <p:nvSpPr>
+          <p:cNvPr id="15" name="Rounded Rectangle 14"/>
+          <p:cNvSpPr/>
+          <p:nvPr/>
+        </p:nvSpPr>
+        <p:spPr>
+          <a:xfrm>
+            <a:off x="4713300" y="2105323"/>
+            <a:ext cx="2520280" cy="2331789"/>
+          </a:xfrm>
+          <a:prstGeom prst="roundRect">
+            <a:avLst/>
+          </a:prstGeom>
+        </p:spPr>
+        <p:style>
+          <a:lnRef idx="1">
+            <a:schemeClr val="accent1"/>
+          </a:lnRef>
+          <a:fillRef idx="2">
+            <a:schemeClr val="accent1"/>
+          </a:fillRef>
+          <a:effectRef idx="1">
+            <a:schemeClr val="accent1"/>
+          </a:effectRef>
+          <a:fontRef idx="minor">
+            <a:schemeClr val="dk1"/>
+          </a:fontRef>
+        </p:style>
+        <p:txBody>
+          <a:bodyPr rtlCol="0" anchor="t"/>
+          <a:lstStyle/>
+          <a:p>
+            <a:pPr algn="ctr"/>
+            <a:r>
+              <a:rPr lang="en-US" dirty="0" smtClean="0">
+                <a:latin typeface="Segoe" charset="0"/>
+                <a:ea typeface="Segoe" charset="0"/>
+                <a:cs typeface="Segoe" charset="0"/>
+              </a:rPr>
+              <a:t>Analysis web server</a:t>
+            </a:r>
+            <a:endParaRPr lang="en-US" dirty="0">
+              <a:latin typeface="Segoe" charset="0"/>
+              <a:ea typeface="Segoe" charset="0"/>
+              <a:cs typeface="Segoe" charset="0"/>
+            </a:endParaRPr>
+          </a:p>
+        </p:txBody>
+      </p:sp>
+      <p:sp>
+        <p:nvSpPr>
+          <p:cNvPr id="16" name="Rounded Rectangle 15"/>
+          <p:cNvSpPr/>
+          <p:nvPr/>
+        </p:nvSpPr>
+        <p:spPr>
+          <a:xfrm>
+            <a:off x="4970341" y="2679837"/>
+            <a:ext cx="2024608" cy="677155"/>
+          </a:xfrm>
+          <a:prstGeom prst="roundRect">
+            <a:avLst/>
+          </a:prstGeom>
+        </p:spPr>
+        <p:style>
+          <a:lnRef idx="1">
+            <a:schemeClr val="accent2"/>
+          </a:lnRef>
+          <a:fillRef idx="2">
+            <a:schemeClr val="accent2"/>
+          </a:fillRef>
+          <a:effectRef idx="1">
+            <a:schemeClr val="accent2"/>
+          </a:effectRef>
+          <a:fontRef idx="minor">
+            <a:schemeClr val="dk1"/>
+          </a:fontRef>
+        </p:style>
+        <p:txBody>
+          <a:bodyPr rtlCol="0" anchor="ctr"/>
+          <a:lstStyle/>
+          <a:p>
+            <a:pPr algn="ctr"/>
+            <a:r>
+              <a:rPr lang="en-US" smtClean="0">
+                <a:latin typeface="Segoe" charset="0"/>
+                <a:ea typeface="Segoe" charset="0"/>
+                <a:cs typeface="Segoe" charset="0"/>
+              </a:rPr>
+              <a:t>Analysis agent proxies</a:t>
+            </a:r>
+            <a:endParaRPr lang="en-US" dirty="0">
+              <a:latin typeface="Segoe" charset="0"/>
+              <a:ea typeface="Segoe" charset="0"/>
+              <a:cs typeface="Segoe" charset="0"/>
+            </a:endParaRPr>
+          </a:p>
+        </p:txBody>
+      </p:sp>
+      <p:sp>
+        <p:nvSpPr>
+          <p:cNvPr id="17" name="Rounded Rectangle 16"/>
+          <p:cNvSpPr/>
+          <p:nvPr/>
+        </p:nvSpPr>
+        <p:spPr>
+          <a:xfrm>
+            <a:off x="1115616" y="4262665"/>
+            <a:ext cx="2024608" cy="606495"/>
+          </a:xfrm>
+          <a:prstGeom prst="roundRect">
+            <a:avLst/>
+          </a:prstGeom>
+        </p:spPr>
+        <p:style>
+          <a:lnRef idx="1">
+            <a:schemeClr val="accent2"/>
+          </a:lnRef>
+          <a:fillRef idx="2">
+            <a:schemeClr val="accent2"/>
+          </a:fillRef>
+          <a:effectRef idx="1">
+            <a:schemeClr val="accent2"/>
+          </a:effectRef>
+          <a:fontRef idx="minor">
+            <a:schemeClr val="dk1"/>
+          </a:fontRef>
+        </p:style>
+        <p:txBody>
+          <a:bodyPr rtlCol="0" anchor="ctr"/>
+          <a:lstStyle/>
+          <a:p>
+            <a:pPr algn="ctr"/>
+            <a:r>
+              <a:rPr lang="en-US" dirty="0" smtClean="0">
+                <a:latin typeface="Segoe" charset="0"/>
+                <a:ea typeface="Segoe" charset="0"/>
+                <a:cs typeface="Segoe" charset="0"/>
+              </a:rPr>
+              <a:t>Analysis </a:t>
+            </a:r>
+            <a:r>
+              <a:rPr lang="en-US" smtClean="0">
+                <a:latin typeface="Segoe" charset="0"/>
+                <a:ea typeface="Segoe" charset="0"/>
+                <a:cs typeface="Segoe" charset="0"/>
+              </a:rPr>
+              <a:t>agent stub</a:t>
+            </a:r>
+            <a:endParaRPr lang="en-US" dirty="0">
+              <a:latin typeface="Segoe" charset="0"/>
+              <a:ea typeface="Segoe" charset="0"/>
+              <a:cs typeface="Segoe" charset="0"/>
+            </a:endParaRPr>
+          </a:p>
+        </p:txBody>
+      </p:sp>
+      <p:sp>
+        <p:nvSpPr>
+          <p:cNvPr id="18" name="Rounded Rectangle 17"/>
+          <p:cNvSpPr/>
+          <p:nvPr/>
+        </p:nvSpPr>
+        <p:spPr>
+          <a:xfrm>
+            <a:off x="4970341" y="3470909"/>
+            <a:ext cx="2024608" cy="677155"/>
+          </a:xfrm>
+          <a:prstGeom prst="roundRect">
+            <a:avLst/>
+          </a:prstGeom>
+        </p:spPr>
+        <p:style>
+          <a:lnRef idx="1">
+            <a:schemeClr val="accent2"/>
+          </a:lnRef>
+          <a:fillRef idx="2">
+            <a:schemeClr val="accent2"/>
+          </a:fillRef>
+          <a:effectRef idx="1">
+            <a:schemeClr val="accent2"/>
+          </a:effectRef>
+          <a:fontRef idx="minor">
+            <a:schemeClr val="dk1"/>
+          </a:fontRef>
+        </p:style>
+        <p:txBody>
+          <a:bodyPr rtlCol="0" anchor="ctr"/>
+          <a:lstStyle/>
+          <a:p>
+            <a:pPr algn="ctr"/>
+            <a:r>
+              <a:rPr lang="en-US" dirty="0" smtClean="0">
+                <a:latin typeface="Segoe" charset="0"/>
+                <a:ea typeface="Segoe" charset="0"/>
+                <a:cs typeface="Segoe" charset="0"/>
+              </a:rPr>
+              <a:t>Server and dump management</a:t>
+            </a:r>
+            <a:endParaRPr lang="en-US" dirty="0">
+              <a:latin typeface="Segoe" charset="0"/>
+              <a:ea typeface="Segoe" charset="0"/>
+              <a:cs typeface="Segoe" charset="0"/>
+            </a:endParaRPr>
+          </a:p>
+        </p:txBody>
+      </p:sp>
+      <p:sp>
+        <p:nvSpPr>
+          <p:cNvPr id="19" name="TextBox 18"/>
+          <p:cNvSpPr txBox="1"/>
+          <p:nvPr/>
+        </p:nvSpPr>
+        <p:spPr>
+          <a:xfrm>
+            <a:off x="4788024" y="4581128"/>
+            <a:ext cx="3845724" cy="1754326"/>
+          </a:xfrm>
+          <a:prstGeom prst="rect">
+            <a:avLst/>
+          </a:prstGeom>
+        </p:spPr>
+        <p:style>
+          <a:lnRef idx="1">
+            <a:schemeClr val="dk1"/>
+          </a:lnRef>
+          <a:fillRef idx="2">
+            <a:schemeClr val="dk1"/>
+          </a:fillRef>
+          <a:effectRef idx="1">
+            <a:schemeClr val="dk1"/>
+          </a:effectRef>
+          <a:fontRef idx="minor">
+            <a:schemeClr val="dk1"/>
+          </a:fontRef>
+        </p:style>
+        <p:txBody>
+          <a:bodyPr wrap="square" rtlCol="0">
+            <a:spAutoFit/>
+          </a:bodyPr>
+          <a:lstStyle/>
+          <a:p>
+            <a:r>
+              <a:rPr lang="en-US" dirty="0" smtClean="0">
+                <a:latin typeface="Consolas" charset="0"/>
+                <a:ea typeface="Consolas" charset="0"/>
+                <a:cs typeface="Consolas" charset="0"/>
+              </a:rPr>
+              <a:t>&gt; connect prod1-west-us</a:t>
+            </a:r>
+          </a:p>
+          <a:p>
+            <a:r>
+              <a:rPr lang="en-US" dirty="0" smtClean="0">
+                <a:latin typeface="Consolas" charset="0"/>
+                <a:ea typeface="Consolas" charset="0"/>
+                <a:cs typeface="Consolas" charset="0"/>
+              </a:rPr>
+              <a:t>&gt; </a:t>
+            </a:r>
+            <a:r>
+              <a:rPr lang="en-US" dirty="0" err="1" smtClean="0">
+                <a:latin typeface="Consolas" charset="0"/>
+                <a:ea typeface="Consolas" charset="0"/>
+                <a:cs typeface="Consolas" charset="0"/>
+              </a:rPr>
+              <a:t>listdumps</a:t>
+            </a:r>
+            <a:r>
+              <a:rPr lang="en-US" dirty="0" smtClean="0">
+                <a:latin typeface="Consolas" charset="0"/>
+                <a:ea typeface="Consolas" charset="0"/>
+                <a:cs typeface="Consolas" charset="0"/>
+              </a:rPr>
+              <a:t> --days 3</a:t>
+            </a:r>
+          </a:p>
+          <a:p>
+            <a:r>
+              <a:rPr lang="en-US" dirty="0" smtClean="0">
+                <a:latin typeface="Consolas" charset="0"/>
+                <a:ea typeface="Consolas" charset="0"/>
+                <a:cs typeface="Consolas" charset="0"/>
+              </a:rPr>
+              <a:t>dump1.dmp</a:t>
+            </a:r>
+          </a:p>
+          <a:p>
+            <a:r>
+              <a:rPr lang="en-US" dirty="0" smtClean="0">
+                <a:latin typeface="Consolas" charset="0"/>
+                <a:ea typeface="Consolas" charset="0"/>
+                <a:cs typeface="Consolas" charset="0"/>
+              </a:rPr>
+              <a:t>dump2.dmp</a:t>
+            </a:r>
+          </a:p>
+          <a:p>
+            <a:r>
+              <a:rPr lang="en-US" dirty="0" smtClean="0">
+                <a:latin typeface="Consolas" charset="0"/>
+                <a:ea typeface="Consolas" charset="0"/>
+                <a:cs typeface="Consolas" charset="0"/>
+              </a:rPr>
+              <a:t>&gt; </a:t>
+            </a:r>
+            <a:r>
+              <a:rPr lang="en-US" dirty="0" err="1" smtClean="0">
+                <a:latin typeface="Consolas" charset="0"/>
+                <a:ea typeface="Consolas" charset="0"/>
+                <a:cs typeface="Consolas" charset="0"/>
+              </a:rPr>
+              <a:t>opendump</a:t>
+            </a:r>
+            <a:r>
+              <a:rPr lang="en-US" dirty="0" smtClean="0">
+                <a:latin typeface="Consolas" charset="0"/>
+                <a:ea typeface="Consolas" charset="0"/>
+                <a:cs typeface="Consolas" charset="0"/>
+              </a:rPr>
+              <a:t> dump1.dmp</a:t>
+            </a:r>
+          </a:p>
+          <a:p>
+            <a:r>
+              <a:rPr lang="en-US" dirty="0" smtClean="0">
+                <a:latin typeface="Consolas" charset="0"/>
+                <a:ea typeface="Consolas" charset="0"/>
+                <a:cs typeface="Consolas" charset="0"/>
+              </a:rPr>
+              <a:t>&gt; </a:t>
+            </a:r>
+            <a:r>
+              <a:rPr lang="en-US" dirty="0" err="1" smtClean="0">
+                <a:latin typeface="Consolas" charset="0"/>
+                <a:ea typeface="Consolas" charset="0"/>
+                <a:cs typeface="Consolas" charset="0"/>
+              </a:rPr>
+              <a:t>printexception</a:t>
+            </a:r>
+            <a:endParaRPr lang="en-US" dirty="0">
+              <a:latin typeface="Consolas" charset="0"/>
+              <a:ea typeface="Consolas" charset="0"/>
+              <a:cs typeface="Consolas" charset="0"/>
+            </a:endParaRPr>
           </a:p>
         </p:txBody>
       </p:sp>
@@ -38442,6 +40041,106 @@
       </p:grpSpPr>
       <p:sp>
         <p:nvSpPr>
+          <p:cNvPr id="8" name="Rounded Rectangle 7"/>
+          <p:cNvSpPr/>
+          <p:nvPr/>
+        </p:nvSpPr>
+        <p:spPr>
+          <a:xfrm>
+            <a:off x="1369120" y="2075461"/>
+            <a:ext cx="2520280" cy="2445087"/>
+          </a:xfrm>
+          <a:prstGeom prst="roundRect">
+            <a:avLst/>
+          </a:prstGeom>
+        </p:spPr>
+        <p:style>
+          <a:lnRef idx="1">
+            <a:schemeClr val="accent1"/>
+          </a:lnRef>
+          <a:fillRef idx="2">
+            <a:schemeClr val="accent1"/>
+          </a:fillRef>
+          <a:effectRef idx="1">
+            <a:schemeClr val="accent1"/>
+          </a:effectRef>
+          <a:fontRef idx="minor">
+            <a:schemeClr val="dk1"/>
+          </a:fontRef>
+        </p:style>
+        <p:txBody>
+          <a:bodyPr rtlCol="0" anchor="t"/>
+          <a:lstStyle/>
+          <a:p>
+            <a:pPr algn="ctr"/>
+            <a:r>
+              <a:rPr lang="en-US" dirty="0" smtClean="0">
+                <a:latin typeface="Segoe" charset="0"/>
+                <a:ea typeface="Segoe" charset="0"/>
+                <a:cs typeface="Segoe" charset="0"/>
+              </a:rPr>
+              <a:t>Production server</a:t>
+            </a:r>
+            <a:endParaRPr lang="en-US" dirty="0">
+              <a:latin typeface="Segoe" charset="0"/>
+              <a:ea typeface="Segoe" charset="0"/>
+              <a:cs typeface="Segoe" charset="0"/>
+            </a:endParaRPr>
+          </a:p>
+        </p:txBody>
+      </p:sp>
+      <p:sp>
+        <p:nvSpPr>
+          <p:cNvPr id="7" name="Rounded Rectangle 6"/>
+          <p:cNvSpPr/>
+          <p:nvPr/>
+        </p:nvSpPr>
+        <p:spPr>
+          <a:xfrm>
+            <a:off x="1118450" y="2526512"/>
+            <a:ext cx="2520280" cy="2445087"/>
+          </a:xfrm>
+          <a:prstGeom prst="roundRect">
+            <a:avLst/>
+          </a:prstGeom>
+        </p:spPr>
+        <p:style>
+          <a:lnRef idx="1">
+            <a:schemeClr val="accent1"/>
+          </a:lnRef>
+          <a:fillRef idx="2">
+            <a:schemeClr val="accent1"/>
+          </a:fillRef>
+          <a:effectRef idx="1">
+            <a:schemeClr val="accent1"/>
+          </a:effectRef>
+          <a:fontRef idx="minor">
+            <a:schemeClr val="dk1"/>
+          </a:fontRef>
+        </p:style>
+        <p:txBody>
+          <a:bodyPr rtlCol="0" anchor="t"/>
+          <a:lstStyle/>
+          <a:p>
+            <a:pPr algn="ctr"/>
+            <a:r>
+              <a:rPr lang="en-US" dirty="0" smtClean="0">
+                <a:latin typeface="Segoe" charset="0"/>
+                <a:ea typeface="Segoe" charset="0"/>
+                <a:cs typeface="Segoe" charset="0"/>
+              </a:rPr>
+              <a:t>Production server</a:t>
+            </a:r>
+            <a:endParaRPr lang="en-US" dirty="0">
+              <a:latin typeface="Segoe" charset="0"/>
+              <a:ea typeface="Segoe" charset="0"/>
+              <a:cs typeface="Segoe" charset="0"/>
+            </a:endParaRPr>
+          </a:p>
+        </p:txBody>
+      </p:sp>
+      <p:sp>
+        <p:nvSpPr>
           <p:cNvPr id="2" name="Title 1"/>
           <p:cNvSpPr>
             <a:spLocks noGrp="1"/>
@@ -38458,12 +40157,8 @@
           <a:lstStyle/>
           <a:p>
             <a:r>
-              <a:rPr lang="en-US" dirty="0" err="1" smtClean="0"/>
-              <a:t>BrightSource</a:t>
-            </a:r>
-            <a:r>
               <a:rPr lang="en-US" dirty="0" smtClean="0"/>
-              <a:t> Automatic Dump Analysis and Ticket Assignment</a:t>
+              <a:t>Client4 Automatic Dump Analysis and Ticket Assignment</a:t>
             </a:r>
             <a:endParaRPr lang="en-US" dirty="0"/>
           </a:p>
@@ -38471,20 +40166,539 @@
       </p:sp>
       <p:sp>
         <p:nvSpPr>
-          <p:cNvPr id="3" name="Content Placeholder 2"/>
-          <p:cNvSpPr>
-            <a:spLocks noGrp="1"/>
-          </p:cNvSpPr>
-          <p:nvPr>
-            <p:ph idx="1"/>
-          </p:nvPr>
+          <p:cNvPr id="4" name="Rounded Rectangle 3"/>
+          <p:cNvSpPr/>
+          <p:nvPr/>
         </p:nvSpPr>
-        <p:spPr/>
+        <p:spPr>
+          <a:xfrm>
+            <a:off x="867780" y="2977563"/>
+            <a:ext cx="2520280" cy="2445087"/>
+          </a:xfrm>
+          <a:prstGeom prst="roundRect">
+            <a:avLst/>
+          </a:prstGeom>
+        </p:spPr>
+        <p:style>
+          <a:lnRef idx="1">
+            <a:schemeClr val="accent1"/>
+          </a:lnRef>
+          <a:fillRef idx="2">
+            <a:schemeClr val="accent1"/>
+          </a:fillRef>
+          <a:effectRef idx="1">
+            <a:schemeClr val="accent1"/>
+          </a:effectRef>
+          <a:fontRef idx="minor">
+            <a:schemeClr val="dk1"/>
+          </a:fontRef>
+        </p:style>
         <p:txBody>
-          <a:bodyPr/>
+          <a:bodyPr rtlCol="0" anchor="t"/>
           <a:lstStyle/>
           <a:p>
-            <a:endParaRPr lang="en-US"/>
+            <a:pPr algn="ctr"/>
+            <a:r>
+              <a:rPr lang="en-US" dirty="0" smtClean="0">
+                <a:latin typeface="Segoe" charset="0"/>
+                <a:ea typeface="Segoe" charset="0"/>
+                <a:cs typeface="Segoe" charset="0"/>
+              </a:rPr>
+              <a:t>Production server</a:t>
+            </a:r>
+            <a:endParaRPr lang="en-US" dirty="0">
+              <a:latin typeface="Segoe" charset="0"/>
+              <a:ea typeface="Segoe" charset="0"/>
+              <a:cs typeface="Segoe" charset="0"/>
+            </a:endParaRPr>
+          </a:p>
+        </p:txBody>
+      </p:sp>
+      <p:sp>
+        <p:nvSpPr>
+          <p:cNvPr id="5" name="Rounded Rectangle 4"/>
+          <p:cNvSpPr/>
+          <p:nvPr/>
+        </p:nvSpPr>
+        <p:spPr>
+          <a:xfrm>
+            <a:off x="1115616" y="3625635"/>
+            <a:ext cx="2024608" cy="1171517"/>
+          </a:xfrm>
+          <a:prstGeom prst="roundRect">
+            <a:avLst/>
+          </a:prstGeom>
+        </p:spPr>
+        <p:style>
+          <a:lnRef idx="1">
+            <a:schemeClr val="accent3"/>
+          </a:lnRef>
+          <a:fillRef idx="2">
+            <a:schemeClr val="accent3"/>
+          </a:fillRef>
+          <a:effectRef idx="1">
+            <a:schemeClr val="accent3"/>
+          </a:effectRef>
+          <a:fontRef idx="minor">
+            <a:schemeClr val="dk1"/>
+          </a:fontRef>
+        </p:style>
+        <p:txBody>
+          <a:bodyPr rtlCol="0" anchor="ctr"/>
+          <a:lstStyle/>
+          <a:p>
+            <a:pPr algn="ctr"/>
+            <a:r>
+              <a:rPr lang="en-US" smtClean="0">
+                <a:latin typeface="Segoe" charset="0"/>
+                <a:ea typeface="Segoe" charset="0"/>
+                <a:cs typeface="Segoe" charset="0"/>
+              </a:rPr>
+              <a:t>Application</a:t>
+            </a:r>
+            <a:endParaRPr lang="en-US" dirty="0">
+              <a:latin typeface="Segoe" charset="0"/>
+              <a:ea typeface="Segoe" charset="0"/>
+              <a:cs typeface="Segoe" charset="0"/>
+            </a:endParaRPr>
+          </a:p>
+        </p:txBody>
+      </p:sp>
+      <p:sp>
+        <p:nvSpPr>
+          <p:cNvPr id="6" name="Can 5"/>
+          <p:cNvSpPr/>
+          <p:nvPr/>
+        </p:nvSpPr>
+        <p:spPr>
+          <a:xfrm>
+            <a:off x="1115616" y="4971599"/>
+            <a:ext cx="2024608" cy="360040"/>
+          </a:xfrm>
+          <a:prstGeom prst="can">
+            <a:avLst/>
+          </a:prstGeom>
+        </p:spPr>
+        <p:style>
+          <a:lnRef idx="1">
+            <a:schemeClr val="dk1"/>
+          </a:lnRef>
+          <a:fillRef idx="2">
+            <a:schemeClr val="dk1"/>
+          </a:fillRef>
+          <a:effectRef idx="1">
+            <a:schemeClr val="dk1"/>
+          </a:effectRef>
+          <a:fontRef idx="minor">
+            <a:schemeClr val="dk1"/>
+          </a:fontRef>
+        </p:style>
+        <p:txBody>
+          <a:bodyPr rtlCol="0" anchor="ctr"/>
+          <a:lstStyle/>
+          <a:p>
+            <a:pPr algn="ctr"/>
+            <a:r>
+              <a:rPr lang="en-US" dirty="0" smtClean="0">
+                <a:latin typeface="Segoe" charset="0"/>
+                <a:ea typeface="Segoe" charset="0"/>
+                <a:cs typeface="Segoe" charset="0"/>
+              </a:rPr>
+              <a:t>WER </a:t>
+            </a:r>
+            <a:r>
+              <a:rPr lang="en-US" b="1" dirty="0" smtClean="0">
+                <a:latin typeface="Segoe" charset="0"/>
+                <a:ea typeface="Segoe" charset="0"/>
+                <a:cs typeface="Segoe" charset="0"/>
+              </a:rPr>
+              <a:t>.</a:t>
+            </a:r>
+            <a:r>
+              <a:rPr lang="en-US" b="1" dirty="0" err="1" smtClean="0">
+                <a:latin typeface="Segoe" charset="0"/>
+                <a:ea typeface="Segoe" charset="0"/>
+                <a:cs typeface="Segoe" charset="0"/>
+              </a:rPr>
+              <a:t>dmp</a:t>
+            </a:r>
+            <a:r>
+              <a:rPr lang="en-US" dirty="0" smtClean="0">
+                <a:latin typeface="Segoe" charset="0"/>
+                <a:ea typeface="Segoe" charset="0"/>
+                <a:cs typeface="Segoe" charset="0"/>
+              </a:rPr>
+              <a:t> files</a:t>
+            </a:r>
+            <a:endParaRPr lang="en-US" b="1" dirty="0">
+              <a:latin typeface="Segoe" charset="0"/>
+              <a:ea typeface="Segoe" charset="0"/>
+              <a:cs typeface="Segoe" charset="0"/>
+            </a:endParaRPr>
+          </a:p>
+        </p:txBody>
+      </p:sp>
+      <p:cxnSp>
+        <p:nvCxnSpPr>
+          <p:cNvPr id="10" name="Straight Connector 9"/>
+          <p:cNvCxnSpPr/>
+          <p:nvPr/>
+        </p:nvCxnSpPr>
+        <p:spPr>
+          <a:xfrm>
+            <a:off x="4211960" y="1772816"/>
+            <a:ext cx="0" cy="4320480"/>
+          </a:xfrm>
+          <a:prstGeom prst="line">
+            <a:avLst/>
+          </a:prstGeom>
+          <a:ln>
+            <a:prstDash val="dash"/>
+          </a:ln>
+        </p:spPr>
+        <p:style>
+          <a:lnRef idx="3">
+            <a:schemeClr val="dk1"/>
+          </a:lnRef>
+          <a:fillRef idx="0">
+            <a:schemeClr val="dk1"/>
+          </a:fillRef>
+          <a:effectRef idx="2">
+            <a:schemeClr val="dk1"/>
+          </a:effectRef>
+          <a:fontRef idx="minor">
+            <a:schemeClr val="tx1"/>
+          </a:fontRef>
+        </p:style>
+      </p:cxnSp>
+      <p:sp>
+        <p:nvSpPr>
+          <p:cNvPr id="14" name="TextBox 13"/>
+          <p:cNvSpPr txBox="1"/>
+          <p:nvPr/>
+        </p:nvSpPr>
+        <p:spPr>
+          <a:xfrm>
+            <a:off x="4211960" y="4797152"/>
+            <a:ext cx="1516762" cy="369332"/>
+          </a:xfrm>
+          <a:prstGeom prst="rect">
+            <a:avLst/>
+          </a:prstGeom>
+          <a:noFill/>
+        </p:spPr>
+        <p:txBody>
+          <a:bodyPr wrap="none" rtlCol="0">
+            <a:spAutoFit/>
+          </a:bodyPr>
+          <a:lstStyle/>
+          <a:p>
+            <a:r>
+              <a:rPr lang="en-US" dirty="0" smtClean="0">
+                <a:latin typeface="Segoe" charset="0"/>
+                <a:ea typeface="Segoe" charset="0"/>
+                <a:cs typeface="Segoe" charset="0"/>
+              </a:rPr>
+              <a:t>One-way link</a:t>
+            </a:r>
+            <a:endParaRPr lang="en-US" dirty="0">
+              <a:latin typeface="Segoe" charset="0"/>
+              <a:ea typeface="Segoe" charset="0"/>
+              <a:cs typeface="Segoe" charset="0"/>
+            </a:endParaRPr>
+          </a:p>
+        </p:txBody>
+      </p:sp>
+      <p:sp>
+        <p:nvSpPr>
+          <p:cNvPr id="16" name="Rounded Rectangle 15"/>
+          <p:cNvSpPr/>
+          <p:nvPr/>
+        </p:nvSpPr>
+        <p:spPr>
+          <a:xfrm>
+            <a:off x="6228184" y="4293096"/>
+            <a:ext cx="2520280" cy="1129553"/>
+          </a:xfrm>
+          <a:prstGeom prst="roundRect">
+            <a:avLst/>
+          </a:prstGeom>
+        </p:spPr>
+        <p:style>
+          <a:lnRef idx="1">
+            <a:schemeClr val="accent1"/>
+          </a:lnRef>
+          <a:fillRef idx="2">
+            <a:schemeClr val="accent1"/>
+          </a:fillRef>
+          <a:effectRef idx="1">
+            <a:schemeClr val="accent1"/>
+          </a:effectRef>
+          <a:fontRef idx="minor">
+            <a:schemeClr val="dk1"/>
+          </a:fontRef>
+        </p:style>
+        <p:txBody>
+          <a:bodyPr rtlCol="0" anchor="t"/>
+          <a:lstStyle/>
+          <a:p>
+            <a:pPr algn="ctr"/>
+            <a:r>
+              <a:rPr lang="en-US" smtClean="0">
+                <a:latin typeface="Segoe" charset="0"/>
+                <a:ea typeface="Segoe" charset="0"/>
+                <a:cs typeface="Segoe" charset="0"/>
+              </a:rPr>
+              <a:t>FTP server</a:t>
+            </a:r>
+            <a:endParaRPr lang="en-US" dirty="0">
+              <a:latin typeface="Segoe" charset="0"/>
+              <a:ea typeface="Segoe" charset="0"/>
+              <a:cs typeface="Segoe" charset="0"/>
+            </a:endParaRPr>
+          </a:p>
+        </p:txBody>
+      </p:sp>
+      <p:sp>
+        <p:nvSpPr>
+          <p:cNvPr id="17" name="Can 16"/>
+          <p:cNvSpPr/>
+          <p:nvPr/>
+        </p:nvSpPr>
+        <p:spPr>
+          <a:xfrm>
+            <a:off x="6476020" y="4690232"/>
+            <a:ext cx="2024608" cy="641407"/>
+          </a:xfrm>
+          <a:prstGeom prst="can">
+            <a:avLst/>
+          </a:prstGeom>
+        </p:spPr>
+        <p:style>
+          <a:lnRef idx="1">
+            <a:schemeClr val="dk1"/>
+          </a:lnRef>
+          <a:fillRef idx="2">
+            <a:schemeClr val="dk1"/>
+          </a:fillRef>
+          <a:effectRef idx="1">
+            <a:schemeClr val="dk1"/>
+          </a:effectRef>
+          <a:fontRef idx="minor">
+            <a:schemeClr val="dk1"/>
+          </a:fontRef>
+        </p:style>
+        <p:txBody>
+          <a:bodyPr rtlCol="0" anchor="ctr"/>
+          <a:lstStyle/>
+          <a:p>
+            <a:pPr algn="ctr"/>
+            <a:r>
+              <a:rPr lang="en-US" dirty="0" smtClean="0">
+                <a:latin typeface="Segoe" charset="0"/>
+                <a:ea typeface="Segoe" charset="0"/>
+                <a:cs typeface="Segoe" charset="0"/>
+              </a:rPr>
+              <a:t>Zipped dumps</a:t>
+            </a:r>
+            <a:endParaRPr lang="en-US" b="1" dirty="0">
+              <a:latin typeface="Segoe" charset="0"/>
+              <a:ea typeface="Segoe" charset="0"/>
+              <a:cs typeface="Segoe" charset="0"/>
+            </a:endParaRPr>
+          </a:p>
+        </p:txBody>
+      </p:sp>
+      <p:sp>
+        <p:nvSpPr>
+          <p:cNvPr id="18" name="Rounded Rectangle 17"/>
+          <p:cNvSpPr/>
+          <p:nvPr/>
+        </p:nvSpPr>
+        <p:spPr>
+          <a:xfrm>
+            <a:off x="4713300" y="2105323"/>
+            <a:ext cx="2520280" cy="1971749"/>
+          </a:xfrm>
+          <a:prstGeom prst="roundRect">
+            <a:avLst/>
+          </a:prstGeom>
+        </p:spPr>
+        <p:style>
+          <a:lnRef idx="1">
+            <a:schemeClr val="accent1"/>
+          </a:lnRef>
+          <a:fillRef idx="2">
+            <a:schemeClr val="accent1"/>
+          </a:fillRef>
+          <a:effectRef idx="1">
+            <a:schemeClr val="accent1"/>
+          </a:effectRef>
+          <a:fontRef idx="minor">
+            <a:schemeClr val="dk1"/>
+          </a:fontRef>
+        </p:style>
+        <p:txBody>
+          <a:bodyPr rtlCol="0" anchor="t"/>
+          <a:lstStyle/>
+          <a:p>
+            <a:pPr algn="ctr"/>
+            <a:r>
+              <a:rPr lang="en-US" dirty="0" smtClean="0">
+                <a:latin typeface="Segoe" charset="0"/>
+                <a:ea typeface="Segoe" charset="0"/>
+                <a:cs typeface="Segoe" charset="0"/>
+              </a:rPr>
+              <a:t>Analysis system</a:t>
+            </a:r>
+            <a:endParaRPr lang="en-US" dirty="0">
+              <a:latin typeface="Segoe" charset="0"/>
+              <a:ea typeface="Segoe" charset="0"/>
+              <a:cs typeface="Segoe" charset="0"/>
+            </a:endParaRPr>
+          </a:p>
+        </p:txBody>
+      </p:sp>
+      <p:sp>
+        <p:nvSpPr>
+          <p:cNvPr id="19" name="Rounded Rectangle 18"/>
+          <p:cNvSpPr/>
+          <p:nvPr/>
+        </p:nvSpPr>
+        <p:spPr>
+          <a:xfrm>
+            <a:off x="7380312" y="2105322"/>
+            <a:ext cx="1517836" cy="1971749"/>
+          </a:xfrm>
+          <a:prstGeom prst="roundRect">
+            <a:avLst/>
+          </a:prstGeom>
+        </p:spPr>
+        <p:style>
+          <a:lnRef idx="1">
+            <a:schemeClr val="accent1"/>
+          </a:lnRef>
+          <a:fillRef idx="2">
+            <a:schemeClr val="accent1"/>
+          </a:fillRef>
+          <a:effectRef idx="1">
+            <a:schemeClr val="accent1"/>
+          </a:effectRef>
+          <a:fontRef idx="minor">
+            <a:schemeClr val="dk1"/>
+          </a:fontRef>
+        </p:style>
+        <p:txBody>
+          <a:bodyPr rtlCol="0" anchor="t"/>
+          <a:lstStyle/>
+          <a:p>
+            <a:pPr algn="ctr"/>
+            <a:r>
+              <a:rPr lang="en-US" dirty="0" err="1" smtClean="0">
+                <a:latin typeface="Segoe" charset="0"/>
+                <a:ea typeface="Segoe" charset="0"/>
+                <a:cs typeface="Segoe" charset="0"/>
+              </a:rPr>
+              <a:t>Redmine</a:t>
+            </a:r>
+            <a:r>
+              <a:rPr lang="en-US" dirty="0" smtClean="0">
+                <a:latin typeface="Segoe" charset="0"/>
+                <a:ea typeface="Segoe" charset="0"/>
+                <a:cs typeface="Segoe" charset="0"/>
+              </a:rPr>
+              <a:t> work item tracker</a:t>
+            </a:r>
+            <a:endParaRPr lang="en-US" dirty="0">
+              <a:latin typeface="Segoe" charset="0"/>
+              <a:ea typeface="Segoe" charset="0"/>
+              <a:cs typeface="Segoe" charset="0"/>
+            </a:endParaRPr>
+          </a:p>
+        </p:txBody>
+      </p:sp>
+      <p:cxnSp>
+        <p:nvCxnSpPr>
+          <p:cNvPr id="13" name="Straight Arrow Connector 12"/>
+          <p:cNvCxnSpPr>
+            <a:stCxn id="6" idx="4"/>
+          </p:cNvCxnSpPr>
+          <p:nvPr/>
+        </p:nvCxnSpPr>
+        <p:spPr>
+          <a:xfrm>
+            <a:off x="3140224" y="5151619"/>
+            <a:ext cx="3335796" cy="14865"/>
+          </a:xfrm>
+          <a:prstGeom prst="straightConnector1">
+            <a:avLst/>
+          </a:prstGeom>
+          <a:ln>
+            <a:tailEnd type="triangle"/>
+          </a:ln>
+        </p:spPr>
+        <p:style>
+          <a:lnRef idx="3">
+            <a:schemeClr val="accent2"/>
+          </a:lnRef>
+          <a:fillRef idx="0">
+            <a:schemeClr val="accent2"/>
+          </a:fillRef>
+          <a:effectRef idx="2">
+            <a:schemeClr val="accent2"/>
+          </a:effectRef>
+          <a:fontRef idx="minor">
+            <a:schemeClr val="tx1"/>
+          </a:fontRef>
+        </p:style>
+      </p:cxnSp>
+      <p:sp>
+        <p:nvSpPr>
+          <p:cNvPr id="21" name="Rounded Rectangle 20"/>
+          <p:cNvSpPr/>
+          <p:nvPr/>
+        </p:nvSpPr>
+        <p:spPr>
+          <a:xfrm>
+            <a:off x="4970341" y="2679837"/>
+            <a:ext cx="2024608" cy="1171517"/>
+          </a:xfrm>
+          <a:prstGeom prst="roundRect">
+            <a:avLst/>
+          </a:prstGeom>
+        </p:spPr>
+        <p:style>
+          <a:lnRef idx="1">
+            <a:schemeClr val="accent2"/>
+          </a:lnRef>
+          <a:fillRef idx="2">
+            <a:schemeClr val="accent2"/>
+          </a:fillRef>
+          <a:effectRef idx="1">
+            <a:schemeClr val="accent2"/>
+          </a:effectRef>
+          <a:fontRef idx="minor">
+            <a:schemeClr val="dk1"/>
+          </a:fontRef>
+        </p:style>
+        <p:txBody>
+          <a:bodyPr rtlCol="0" anchor="ctr"/>
+          <a:lstStyle/>
+          <a:p>
+            <a:pPr algn="ctr"/>
+            <a:r>
+              <a:rPr lang="en-US" dirty="0" smtClean="0">
+                <a:latin typeface="Segoe" charset="0"/>
+                <a:ea typeface="Segoe" charset="0"/>
+                <a:cs typeface="Segoe" charset="0"/>
+              </a:rPr>
+              <a:t>Dump analysis and triage agent</a:t>
+            </a:r>
+            <a:endParaRPr lang="en-US" dirty="0">
+              <a:latin typeface="Segoe" charset="0"/>
+              <a:ea typeface="Segoe" charset="0"/>
+              <a:cs typeface="Segoe" charset="0"/>
+            </a:endParaRPr>
           </a:p>
         </p:txBody>
       </p:sp>

</xml_diff>